<commit_message>
Schéma milieu de stage terminer
</commit_message>
<xml_diff>
--- a/Documentation/SchémaMilieudeStage.pptx
+++ b/Documentation/SchémaMilieudeStage.pptx
@@ -104,6 +104,11 @@
       </a:defRPr>
     </a:lvl9pPr>
   </p:defaultTextStyle>
+  <p:extLst>
+    <p:ext uri="{EFAFB233-063F-42B5-8137-9DF3F51BA10A}">
+      <p15:sldGuideLst xmlns:p15="http://schemas.microsoft.com/office/powerpoint/2012/main"/>
+    </p:ext>
+  </p:extLst>
 </p:presentation>
 </file>
 
@@ -238,7 +243,7 @@
           <a:p>
             <a:fld id="{952D37C9-57C9-4E74-9BE9-5A5CF4DA06F6}" type="datetimeFigureOut">
               <a:rPr lang="fr-CA" smtClean="0"/>
-              <a:t>2020-03-09</a:t>
+              <a:t>2020-03-10</a:t>
             </a:fld>
             <a:endParaRPr lang="fr-CA"/>
           </a:p>
@@ -408,7 +413,7 @@
           <a:p>
             <a:fld id="{952D37C9-57C9-4E74-9BE9-5A5CF4DA06F6}" type="datetimeFigureOut">
               <a:rPr lang="fr-CA" smtClean="0"/>
-              <a:t>2020-03-09</a:t>
+              <a:t>2020-03-10</a:t>
             </a:fld>
             <a:endParaRPr lang="fr-CA"/>
           </a:p>
@@ -588,7 +593,7 @@
           <a:p>
             <a:fld id="{952D37C9-57C9-4E74-9BE9-5A5CF4DA06F6}" type="datetimeFigureOut">
               <a:rPr lang="fr-CA" smtClean="0"/>
-              <a:t>2020-03-09</a:t>
+              <a:t>2020-03-10</a:t>
             </a:fld>
             <a:endParaRPr lang="fr-CA"/>
           </a:p>
@@ -758,7 +763,7 @@
           <a:p>
             <a:fld id="{952D37C9-57C9-4E74-9BE9-5A5CF4DA06F6}" type="datetimeFigureOut">
               <a:rPr lang="fr-CA" smtClean="0"/>
-              <a:t>2020-03-09</a:t>
+              <a:t>2020-03-10</a:t>
             </a:fld>
             <a:endParaRPr lang="fr-CA"/>
           </a:p>
@@ -1004,7 +1009,7 @@
           <a:p>
             <a:fld id="{952D37C9-57C9-4E74-9BE9-5A5CF4DA06F6}" type="datetimeFigureOut">
               <a:rPr lang="fr-CA" smtClean="0"/>
-              <a:t>2020-03-09</a:t>
+              <a:t>2020-03-10</a:t>
             </a:fld>
             <a:endParaRPr lang="fr-CA"/>
           </a:p>
@@ -1236,7 +1241,7 @@
           <a:p>
             <a:fld id="{952D37C9-57C9-4E74-9BE9-5A5CF4DA06F6}" type="datetimeFigureOut">
               <a:rPr lang="fr-CA" smtClean="0"/>
-              <a:t>2020-03-09</a:t>
+              <a:t>2020-03-10</a:t>
             </a:fld>
             <a:endParaRPr lang="fr-CA"/>
           </a:p>
@@ -1603,7 +1608,7 @@
           <a:p>
             <a:fld id="{952D37C9-57C9-4E74-9BE9-5A5CF4DA06F6}" type="datetimeFigureOut">
               <a:rPr lang="fr-CA" smtClean="0"/>
-              <a:t>2020-03-09</a:t>
+              <a:t>2020-03-10</a:t>
             </a:fld>
             <a:endParaRPr lang="fr-CA"/>
           </a:p>
@@ -1721,7 +1726,7 @@
           <a:p>
             <a:fld id="{952D37C9-57C9-4E74-9BE9-5A5CF4DA06F6}" type="datetimeFigureOut">
               <a:rPr lang="fr-CA" smtClean="0"/>
-              <a:t>2020-03-09</a:t>
+              <a:t>2020-03-10</a:t>
             </a:fld>
             <a:endParaRPr lang="fr-CA"/>
           </a:p>
@@ -1816,7 +1821,7 @@
           <a:p>
             <a:fld id="{952D37C9-57C9-4E74-9BE9-5A5CF4DA06F6}" type="datetimeFigureOut">
               <a:rPr lang="fr-CA" smtClean="0"/>
-              <a:t>2020-03-09</a:t>
+              <a:t>2020-03-10</a:t>
             </a:fld>
             <a:endParaRPr lang="fr-CA"/>
           </a:p>
@@ -2093,7 +2098,7 @@
           <a:p>
             <a:fld id="{952D37C9-57C9-4E74-9BE9-5A5CF4DA06F6}" type="datetimeFigureOut">
               <a:rPr lang="fr-CA" smtClean="0"/>
-              <a:t>2020-03-09</a:t>
+              <a:t>2020-03-10</a:t>
             </a:fld>
             <a:endParaRPr lang="fr-CA"/>
           </a:p>
@@ -2346,7 +2351,7 @@
           <a:p>
             <a:fld id="{952D37C9-57C9-4E74-9BE9-5A5CF4DA06F6}" type="datetimeFigureOut">
               <a:rPr lang="fr-CA" smtClean="0"/>
-              <a:t>2020-03-09</a:t>
+              <a:t>2020-03-10</a:t>
             </a:fld>
             <a:endParaRPr lang="fr-CA"/>
           </a:p>
@@ -2559,7 +2564,7 @@
           <a:p>
             <a:fld id="{952D37C9-57C9-4E74-9BE9-5A5CF4DA06F6}" type="datetimeFigureOut">
               <a:rPr lang="fr-CA" smtClean="0"/>
-              <a:t>2020-03-09</a:t>
+              <a:t>2020-03-10</a:t>
             </a:fld>
             <a:endParaRPr lang="fr-CA"/>
           </a:p>
@@ -2979,7 +2984,7 @@
         </p:blipFill>
         <p:spPr>
           <a:xfrm>
-            <a:off x="-1" y="6352206"/>
+            <a:off x="-1" y="6651466"/>
             <a:ext cx="12192001" cy="189909"/>
           </a:xfrm>
           <a:prstGeom prst="rect">
@@ -3081,13 +3086,21 @@
           <p:nvPr/>
         </p:nvPicPr>
         <p:blipFill rotWithShape="1">
-          <a:blip r:embed="rId6"/>
+          <a:blip r:embed="rId6">
+            <a:duotone>
+              <a:schemeClr val="accent2">
+                <a:shade val="45000"/>
+                <a:satMod val="135000"/>
+              </a:schemeClr>
+              <a:prstClr val="white"/>
+            </a:duotone>
+          </a:blip>
           <a:srcRect l="1" r="12859"/>
           <a:stretch/>
         </p:blipFill>
         <p:spPr>
           <a:xfrm>
-            <a:off x="3816542" y="639849"/>
+            <a:off x="4157363" y="614910"/>
             <a:ext cx="722207" cy="590632"/>
           </a:xfrm>
           <a:prstGeom prst="rect">
@@ -3188,7 +3201,7 @@
         </p:nvSpPr>
         <p:spPr>
           <a:xfrm>
-            <a:off x="4536631" y="1259358"/>
+            <a:off x="4536631" y="1433923"/>
             <a:ext cx="656706" cy="338554"/>
           </a:xfrm>
           <a:prstGeom prst="rect">
@@ -3226,7 +3239,7 @@
         </p:blipFill>
         <p:spPr>
           <a:xfrm>
-            <a:off x="5193337" y="2157186"/>
+            <a:off x="5193337" y="2120496"/>
             <a:ext cx="1838582" cy="47632"/>
           </a:xfrm>
           <a:prstGeom prst="rect">
@@ -3242,7 +3255,7 @@
         </p:nvSpPr>
         <p:spPr>
           <a:xfrm>
-            <a:off x="3990110" y="1866264"/>
+            <a:off x="3990110" y="1841325"/>
             <a:ext cx="1203228" cy="338554"/>
           </a:xfrm>
           <a:prstGeom prst="rect">
@@ -3272,7 +3285,7 @@
         </p:nvSpPr>
         <p:spPr>
           <a:xfrm>
-            <a:off x="3632662" y="2454512"/>
+            <a:off x="3632662" y="2271633"/>
             <a:ext cx="1560675" cy="338554"/>
           </a:xfrm>
           <a:prstGeom prst="rect">
@@ -3310,7 +3323,7 @@
         </p:blipFill>
         <p:spPr>
           <a:xfrm>
-            <a:off x="5186406" y="2703553"/>
+            <a:off x="5186406" y="2564861"/>
             <a:ext cx="1838582" cy="47632"/>
           </a:xfrm>
           <a:prstGeom prst="rect">
@@ -3334,7 +3347,7 @@
         </p:blipFill>
         <p:spPr>
           <a:xfrm>
-            <a:off x="5176709" y="1501566"/>
+            <a:off x="5176709" y="1676131"/>
             <a:ext cx="1838582" cy="47632"/>
           </a:xfrm>
           <a:prstGeom prst="rect">
@@ -3350,7 +3363,7 @@
         </p:nvSpPr>
         <p:spPr>
           <a:xfrm>
-            <a:off x="4605251" y="3048504"/>
+            <a:off x="4605251" y="2749243"/>
             <a:ext cx="569340" cy="338554"/>
           </a:xfrm>
           <a:prstGeom prst="rect">
@@ -3388,7 +3401,7 @@
         </p:blipFill>
         <p:spPr>
           <a:xfrm>
-            <a:off x="5160083" y="3338679"/>
+            <a:off x="5160083" y="3009226"/>
             <a:ext cx="1838582" cy="47632"/>
           </a:xfrm>
           <a:prstGeom prst="rect">
@@ -3412,7 +3425,7 @@
         </p:blipFill>
         <p:spPr>
           <a:xfrm>
-            <a:off x="5176709" y="3812504"/>
+            <a:off x="5176709" y="3453591"/>
             <a:ext cx="1838582" cy="47632"/>
           </a:xfrm>
           <a:prstGeom prst="rect">
@@ -3428,7 +3441,7 @@
         </p:nvSpPr>
         <p:spPr>
           <a:xfrm>
-            <a:off x="3931920" y="3574973"/>
+            <a:off x="3940233" y="3184274"/>
             <a:ext cx="1237130" cy="338554"/>
           </a:xfrm>
           <a:prstGeom prst="rect">
@@ -3465,7 +3478,7 @@
         </p:blipFill>
         <p:spPr>
           <a:xfrm>
-            <a:off x="7097594" y="3516789"/>
+            <a:off x="7097594" y="3142715"/>
             <a:ext cx="1831187" cy="368494"/>
           </a:xfrm>
           <a:prstGeom prst="rect">
@@ -3488,7 +3501,7 @@
         </p:blipFill>
         <p:spPr>
           <a:xfrm>
-            <a:off x="5161467" y="4133377"/>
+            <a:off x="5161467" y="3897956"/>
             <a:ext cx="1879412" cy="139367"/>
           </a:xfrm>
           <a:prstGeom prst="rect">
@@ -3504,8 +3517,8 @@
         </p:nvSpPr>
         <p:spPr>
           <a:xfrm>
-            <a:off x="4189614" y="4002182"/>
-            <a:ext cx="965581" cy="338554"/>
+            <a:off x="4536631" y="3686300"/>
+            <a:ext cx="619294" cy="338554"/>
           </a:xfrm>
           <a:prstGeom prst="rect">
             <a:avLst/>
@@ -3520,7 +3533,7 @@
           <a:p>
             <a:r>
               <a:rPr lang="fr-CA" sz="1600" dirty="0" smtClean="0"/>
-              <a:t>Province:</a:t>
+              <a:t>Ville:</a:t>
             </a:r>
             <a:endParaRPr lang="fr-CA" sz="1600" dirty="0"/>
           </a:p>
@@ -3541,7 +3554,7 @@
         </p:blipFill>
         <p:spPr>
           <a:xfrm>
-            <a:off x="5155925" y="4651533"/>
+            <a:off x="5155925" y="4434056"/>
             <a:ext cx="1879412" cy="139367"/>
           </a:xfrm>
           <a:prstGeom prst="rect">
@@ -3557,8 +3570,8 @@
         </p:nvSpPr>
         <p:spPr>
           <a:xfrm>
-            <a:off x="4536630" y="4471264"/>
-            <a:ext cx="613023" cy="338554"/>
+            <a:off x="4156366" y="4246819"/>
+            <a:ext cx="1059792" cy="338554"/>
           </a:xfrm>
           <a:prstGeom prst="rect">
             <a:avLst/>
@@ -3572,8 +3585,8 @@
           <a:lstStyle/>
           <a:p>
             <a:r>
-              <a:rPr lang="fr-CA" sz="1600" dirty="0" smtClean="0"/>
-              <a:t>Pays:</a:t>
+              <a:rPr lang="fr-CA" sz="1600" dirty="0"/>
+              <a:t>Province :</a:t>
             </a:r>
             <a:endParaRPr lang="fr-CA" sz="1600" dirty="0"/>
           </a:p>
@@ -3594,7 +3607,7 @@
         </p:blipFill>
         <p:spPr>
           <a:xfrm>
-            <a:off x="5125446" y="5069944"/>
+            <a:off x="5125446" y="4970156"/>
             <a:ext cx="1879412" cy="139367"/>
           </a:xfrm>
           <a:prstGeom prst="rect">
@@ -3610,7 +3623,7 @@
         </p:nvSpPr>
         <p:spPr>
           <a:xfrm>
-            <a:off x="3084024" y="4891209"/>
+            <a:off x="3084024" y="5331781"/>
             <a:ext cx="2105805" cy="338554"/>
           </a:xfrm>
           <a:prstGeom prst="rect">
@@ -3663,8 +3676,8 @@
         </p:nvSpPr>
         <p:spPr>
           <a:xfrm>
-            <a:off x="3167149" y="5367969"/>
-            <a:ext cx="2016078" cy="338554"/>
+            <a:off x="4056611" y="5816855"/>
+            <a:ext cx="1143242" cy="338554"/>
           </a:xfrm>
           <a:prstGeom prst="rect">
             <a:avLst/>
@@ -3679,12 +3692,152 @@
           <a:p>
             <a:r>
               <a:rPr lang="fr-CA" sz="1600" dirty="0" smtClean="0"/>
-              <a:t>Disponible(Oui/Non):</a:t>
+              <a:t>Disponible:</a:t>
             </a:r>
             <a:endParaRPr lang="fr-CA" sz="1600" dirty="0"/>
           </a:p>
         </p:txBody>
       </p:sp>
+      <p:pic>
+        <p:nvPicPr>
+          <p:cNvPr id="2" name="Image 1"/>
+          <p:cNvPicPr>
+            <a:picLocks noChangeAspect="1"/>
+          </p:cNvPicPr>
+          <p:nvPr/>
+        </p:nvPicPr>
+        <p:blipFill>
+          <a:blip r:embed="rId12">
+            <a:duotone>
+              <a:schemeClr val="accent2">
+                <a:shade val="45000"/>
+                <a:satMod val="135000"/>
+              </a:schemeClr>
+              <a:prstClr val="white"/>
+            </a:duotone>
+            <a:extLst>
+              <a:ext uri="{BEBA8EAE-BF5A-486C-A8C5-ECC9F3942E4B}">
+                <a14:imgProps xmlns:a14="http://schemas.microsoft.com/office/drawing/2010/main">
+                  <a14:imgLayer r:embed="rId13">
+                    <a14:imgEffect>
+                      <a14:saturation sat="0"/>
+                    </a14:imgEffect>
+                  </a14:imgLayer>
+                </a14:imgProps>
+              </a:ext>
+            </a:extLst>
+          </a:blip>
+          <a:stretch>
+            <a:fillRect/>
+          </a:stretch>
+        </p:blipFill>
+        <p:spPr>
+          <a:xfrm>
+            <a:off x="6241818" y="6268895"/>
+            <a:ext cx="1247949" cy="438211"/>
+          </a:xfrm>
+          <a:prstGeom prst="rect">
+            <a:avLst/>
+          </a:prstGeom>
+        </p:spPr>
+      </p:pic>
+      <p:pic>
+        <p:nvPicPr>
+          <p:cNvPr id="3" name="Image 2"/>
+          <p:cNvPicPr>
+            <a:picLocks noChangeAspect="1"/>
+          </p:cNvPicPr>
+          <p:nvPr/>
+        </p:nvPicPr>
+        <p:blipFill>
+          <a:blip r:embed="rId14">
+            <a:duotone>
+              <a:schemeClr val="accent3">
+                <a:shade val="45000"/>
+                <a:satMod val="135000"/>
+              </a:schemeClr>
+              <a:prstClr val="white"/>
+            </a:duotone>
+            <a:extLst>
+              <a:ext uri="{BEBA8EAE-BF5A-486C-A8C5-ECC9F3942E4B}">
+                <a14:imgProps xmlns:a14="http://schemas.microsoft.com/office/drawing/2010/main">
+                  <a14:imgLayer r:embed="rId15">
+                    <a14:imgEffect>
+                      <a14:saturation sat="0"/>
+                    </a14:imgEffect>
+                  </a14:imgLayer>
+                </a14:imgProps>
+              </a:ext>
+            </a:extLst>
+          </a:blip>
+          <a:stretch>
+            <a:fillRect/>
+          </a:stretch>
+        </p:blipFill>
+        <p:spPr>
+          <a:xfrm>
+            <a:off x="4338245" y="6268895"/>
+            <a:ext cx="1009791" cy="438211"/>
+          </a:xfrm>
+          <a:prstGeom prst="rect">
+            <a:avLst/>
+          </a:prstGeom>
+        </p:spPr>
+      </p:pic>
+      <p:sp>
+        <p:nvSpPr>
+          <p:cNvPr id="32" name="ZoneTexte 31"/>
+          <p:cNvSpPr txBox="1"/>
+          <p:nvPr/>
+        </p:nvSpPr>
+        <p:spPr>
+          <a:xfrm>
+            <a:off x="4501992" y="4788344"/>
+            <a:ext cx="613023" cy="338554"/>
+          </a:xfrm>
+          <a:prstGeom prst="rect">
+            <a:avLst/>
+          </a:prstGeom>
+          <a:noFill/>
+        </p:spPr>
+        <p:txBody>
+          <a:bodyPr wrap="square" rtlCol="0">
+            <a:spAutoFit/>
+          </a:bodyPr>
+          <a:lstStyle/>
+          <a:p>
+            <a:r>
+              <a:rPr lang="fr-CA" sz="1600" dirty="0" smtClean="0"/>
+              <a:t>Pays:</a:t>
+            </a:r>
+            <a:endParaRPr lang="fr-CA" sz="1600" dirty="0"/>
+          </a:p>
+        </p:txBody>
+      </p:sp>
+      <p:pic>
+        <p:nvPicPr>
+          <p:cNvPr id="4" name="Image 3"/>
+          <p:cNvPicPr>
+            <a:picLocks noChangeAspect="1"/>
+          </p:cNvPicPr>
+          <p:nvPr/>
+        </p:nvPicPr>
+        <p:blipFill>
+          <a:blip r:embed="rId16"/>
+          <a:stretch>
+            <a:fillRect/>
+          </a:stretch>
+        </p:blipFill>
+        <p:spPr>
+          <a:xfrm>
+            <a:off x="5348036" y="5800076"/>
+            <a:ext cx="1257475" cy="314369"/>
+          </a:xfrm>
+          <a:prstGeom prst="rect">
+            <a:avLst/>
+          </a:prstGeom>
+        </p:spPr>
+      </p:pic>
     </p:spTree>
     <p:extLst>
       <p:ext uri="{BB962C8B-B14F-4D97-AF65-F5344CB8AC3E}">

</xml_diff>

<commit_message>
Schéma ajout milieu de stage terminer
</commit_message>
<xml_diff>
--- a/Documentation/SchémaMilieudeStage.pptx
+++ b/Documentation/SchémaMilieudeStage.pptx
@@ -104,6 +104,11 @@
       </a:defRPr>
     </a:lvl9pPr>
   </p:defaultTextStyle>
+  <p:extLst>
+    <p:ext uri="{EFAFB233-063F-42B5-8137-9DF3F51BA10A}">
+      <p15:sldGuideLst xmlns:p15="http://schemas.microsoft.com/office/powerpoint/2012/main"/>
+    </p:ext>
+  </p:extLst>
 </p:presentation>
 </file>
 
@@ -238,7 +243,7 @@
           <a:p>
             <a:fld id="{952D37C9-57C9-4E74-9BE9-5A5CF4DA06F6}" type="datetimeFigureOut">
               <a:rPr lang="fr-CA" smtClean="0"/>
-              <a:t>2020-03-09</a:t>
+              <a:t>2020-03-10</a:t>
             </a:fld>
             <a:endParaRPr lang="fr-CA"/>
           </a:p>
@@ -408,7 +413,7 @@
           <a:p>
             <a:fld id="{952D37C9-57C9-4E74-9BE9-5A5CF4DA06F6}" type="datetimeFigureOut">
               <a:rPr lang="fr-CA" smtClean="0"/>
-              <a:t>2020-03-09</a:t>
+              <a:t>2020-03-10</a:t>
             </a:fld>
             <a:endParaRPr lang="fr-CA"/>
           </a:p>
@@ -588,7 +593,7 @@
           <a:p>
             <a:fld id="{952D37C9-57C9-4E74-9BE9-5A5CF4DA06F6}" type="datetimeFigureOut">
               <a:rPr lang="fr-CA" smtClean="0"/>
-              <a:t>2020-03-09</a:t>
+              <a:t>2020-03-10</a:t>
             </a:fld>
             <a:endParaRPr lang="fr-CA"/>
           </a:p>
@@ -758,7 +763,7 @@
           <a:p>
             <a:fld id="{952D37C9-57C9-4E74-9BE9-5A5CF4DA06F6}" type="datetimeFigureOut">
               <a:rPr lang="fr-CA" smtClean="0"/>
-              <a:t>2020-03-09</a:t>
+              <a:t>2020-03-10</a:t>
             </a:fld>
             <a:endParaRPr lang="fr-CA"/>
           </a:p>
@@ -1004,7 +1009,7 @@
           <a:p>
             <a:fld id="{952D37C9-57C9-4E74-9BE9-5A5CF4DA06F6}" type="datetimeFigureOut">
               <a:rPr lang="fr-CA" smtClean="0"/>
-              <a:t>2020-03-09</a:t>
+              <a:t>2020-03-10</a:t>
             </a:fld>
             <a:endParaRPr lang="fr-CA"/>
           </a:p>
@@ -1236,7 +1241,7 @@
           <a:p>
             <a:fld id="{952D37C9-57C9-4E74-9BE9-5A5CF4DA06F6}" type="datetimeFigureOut">
               <a:rPr lang="fr-CA" smtClean="0"/>
-              <a:t>2020-03-09</a:t>
+              <a:t>2020-03-10</a:t>
             </a:fld>
             <a:endParaRPr lang="fr-CA"/>
           </a:p>
@@ -1603,7 +1608,7 @@
           <a:p>
             <a:fld id="{952D37C9-57C9-4E74-9BE9-5A5CF4DA06F6}" type="datetimeFigureOut">
               <a:rPr lang="fr-CA" smtClean="0"/>
-              <a:t>2020-03-09</a:t>
+              <a:t>2020-03-10</a:t>
             </a:fld>
             <a:endParaRPr lang="fr-CA"/>
           </a:p>
@@ -1721,7 +1726,7 @@
           <a:p>
             <a:fld id="{952D37C9-57C9-4E74-9BE9-5A5CF4DA06F6}" type="datetimeFigureOut">
               <a:rPr lang="fr-CA" smtClean="0"/>
-              <a:t>2020-03-09</a:t>
+              <a:t>2020-03-10</a:t>
             </a:fld>
             <a:endParaRPr lang="fr-CA"/>
           </a:p>
@@ -1816,7 +1821,7 @@
           <a:p>
             <a:fld id="{952D37C9-57C9-4E74-9BE9-5A5CF4DA06F6}" type="datetimeFigureOut">
               <a:rPr lang="fr-CA" smtClean="0"/>
-              <a:t>2020-03-09</a:t>
+              <a:t>2020-03-10</a:t>
             </a:fld>
             <a:endParaRPr lang="fr-CA"/>
           </a:p>
@@ -2093,7 +2098,7 @@
           <a:p>
             <a:fld id="{952D37C9-57C9-4E74-9BE9-5A5CF4DA06F6}" type="datetimeFigureOut">
               <a:rPr lang="fr-CA" smtClean="0"/>
-              <a:t>2020-03-09</a:t>
+              <a:t>2020-03-10</a:t>
             </a:fld>
             <a:endParaRPr lang="fr-CA"/>
           </a:p>
@@ -2346,7 +2351,7 @@
           <a:p>
             <a:fld id="{952D37C9-57C9-4E74-9BE9-5A5CF4DA06F6}" type="datetimeFigureOut">
               <a:rPr lang="fr-CA" smtClean="0"/>
-              <a:t>2020-03-09</a:t>
+              <a:t>2020-03-10</a:t>
             </a:fld>
             <a:endParaRPr lang="fr-CA"/>
           </a:p>
@@ -2559,7 +2564,7 @@
           <a:p>
             <a:fld id="{952D37C9-57C9-4E74-9BE9-5A5CF4DA06F6}" type="datetimeFigureOut">
               <a:rPr lang="fr-CA" smtClean="0"/>
-              <a:t>2020-03-09</a:t>
+              <a:t>2020-03-10</a:t>
             </a:fld>
             <a:endParaRPr lang="fr-CA"/>
           </a:p>
@@ -2979,7 +2984,7 @@
         </p:blipFill>
         <p:spPr>
           <a:xfrm>
-            <a:off x="-1" y="6352206"/>
+            <a:off x="-1" y="6651466"/>
             <a:ext cx="12192001" cy="189909"/>
           </a:xfrm>
           <a:prstGeom prst="rect">
@@ -3081,13 +3086,21 @@
           <p:nvPr/>
         </p:nvPicPr>
         <p:blipFill rotWithShape="1">
-          <a:blip r:embed="rId6"/>
+          <a:blip r:embed="rId6">
+            <a:duotone>
+              <a:schemeClr val="accent2">
+                <a:shade val="45000"/>
+                <a:satMod val="135000"/>
+              </a:schemeClr>
+              <a:prstClr val="white"/>
+            </a:duotone>
+          </a:blip>
           <a:srcRect l="1" r="12859"/>
           <a:stretch/>
         </p:blipFill>
         <p:spPr>
           <a:xfrm>
-            <a:off x="3816542" y="639849"/>
+            <a:off x="4157363" y="614910"/>
             <a:ext cx="722207" cy="590632"/>
           </a:xfrm>
           <a:prstGeom prst="rect">
@@ -3188,7 +3201,7 @@
         </p:nvSpPr>
         <p:spPr>
           <a:xfrm>
-            <a:off x="4536631" y="1259358"/>
+            <a:off x="4536631" y="1433923"/>
             <a:ext cx="656706" cy="338554"/>
           </a:xfrm>
           <a:prstGeom prst="rect">
@@ -3226,7 +3239,7 @@
         </p:blipFill>
         <p:spPr>
           <a:xfrm>
-            <a:off x="5193337" y="2157186"/>
+            <a:off x="5193337" y="2120496"/>
             <a:ext cx="1838582" cy="47632"/>
           </a:xfrm>
           <a:prstGeom prst="rect">
@@ -3242,7 +3255,7 @@
         </p:nvSpPr>
         <p:spPr>
           <a:xfrm>
-            <a:off x="3990110" y="1866264"/>
+            <a:off x="3990110" y="1841325"/>
             <a:ext cx="1203228" cy="338554"/>
           </a:xfrm>
           <a:prstGeom prst="rect">
@@ -3272,7 +3285,7 @@
         </p:nvSpPr>
         <p:spPr>
           <a:xfrm>
-            <a:off x="3632662" y="2454512"/>
+            <a:off x="3632662" y="2271633"/>
             <a:ext cx="1560675" cy="338554"/>
           </a:xfrm>
           <a:prstGeom prst="rect">
@@ -3310,7 +3323,7 @@
         </p:blipFill>
         <p:spPr>
           <a:xfrm>
-            <a:off x="5186406" y="2703553"/>
+            <a:off x="5186406" y="2564861"/>
             <a:ext cx="1838582" cy="47632"/>
           </a:xfrm>
           <a:prstGeom prst="rect">
@@ -3334,7 +3347,7 @@
         </p:blipFill>
         <p:spPr>
           <a:xfrm>
-            <a:off x="5176709" y="1501566"/>
+            <a:off x="5176709" y="1676131"/>
             <a:ext cx="1838582" cy="47632"/>
           </a:xfrm>
           <a:prstGeom prst="rect">
@@ -3350,7 +3363,7 @@
         </p:nvSpPr>
         <p:spPr>
           <a:xfrm>
-            <a:off x="4605251" y="3048504"/>
+            <a:off x="4605251" y="2749243"/>
             <a:ext cx="569340" cy="338554"/>
           </a:xfrm>
           <a:prstGeom prst="rect">
@@ -3388,7 +3401,7 @@
         </p:blipFill>
         <p:spPr>
           <a:xfrm>
-            <a:off x="5160083" y="3338679"/>
+            <a:off x="5160083" y="3009226"/>
             <a:ext cx="1838582" cy="47632"/>
           </a:xfrm>
           <a:prstGeom prst="rect">
@@ -3412,7 +3425,7 @@
         </p:blipFill>
         <p:spPr>
           <a:xfrm>
-            <a:off x="5176709" y="3812504"/>
+            <a:off x="5176709" y="3453591"/>
             <a:ext cx="1838582" cy="47632"/>
           </a:xfrm>
           <a:prstGeom prst="rect">
@@ -3428,7 +3441,7 @@
         </p:nvSpPr>
         <p:spPr>
           <a:xfrm>
-            <a:off x="3931920" y="3574973"/>
+            <a:off x="3940233" y="3184274"/>
             <a:ext cx="1237130" cy="338554"/>
           </a:xfrm>
           <a:prstGeom prst="rect">
@@ -3465,7 +3478,7 @@
         </p:blipFill>
         <p:spPr>
           <a:xfrm>
-            <a:off x="7097594" y="3516789"/>
+            <a:off x="7097594" y="3142715"/>
             <a:ext cx="1831187" cy="368494"/>
           </a:xfrm>
           <a:prstGeom prst="rect">
@@ -3488,7 +3501,7 @@
         </p:blipFill>
         <p:spPr>
           <a:xfrm>
-            <a:off x="5161467" y="4133377"/>
+            <a:off x="5161467" y="3897956"/>
             <a:ext cx="1879412" cy="139367"/>
           </a:xfrm>
           <a:prstGeom prst="rect">
@@ -3504,8 +3517,8 @@
         </p:nvSpPr>
         <p:spPr>
           <a:xfrm>
-            <a:off x="4189614" y="4002182"/>
-            <a:ext cx="965581" cy="338554"/>
+            <a:off x="4536631" y="3686300"/>
+            <a:ext cx="619294" cy="338554"/>
           </a:xfrm>
           <a:prstGeom prst="rect">
             <a:avLst/>
@@ -3520,7 +3533,7 @@
           <a:p>
             <a:r>
               <a:rPr lang="fr-CA" sz="1600" dirty="0" smtClean="0"/>
-              <a:t>Province:</a:t>
+              <a:t>Ville:</a:t>
             </a:r>
             <a:endParaRPr lang="fr-CA" sz="1600" dirty="0"/>
           </a:p>
@@ -3541,7 +3554,7 @@
         </p:blipFill>
         <p:spPr>
           <a:xfrm>
-            <a:off x="5155925" y="4651533"/>
+            <a:off x="5155925" y="4434056"/>
             <a:ext cx="1879412" cy="139367"/>
           </a:xfrm>
           <a:prstGeom prst="rect">
@@ -3557,8 +3570,8 @@
         </p:nvSpPr>
         <p:spPr>
           <a:xfrm>
-            <a:off x="4536630" y="4471264"/>
-            <a:ext cx="613023" cy="338554"/>
+            <a:off x="4156366" y="4246819"/>
+            <a:ext cx="1059792" cy="338554"/>
           </a:xfrm>
           <a:prstGeom prst="rect">
             <a:avLst/>
@@ -3572,8 +3585,8 @@
           <a:lstStyle/>
           <a:p>
             <a:r>
-              <a:rPr lang="fr-CA" sz="1600" dirty="0" smtClean="0"/>
-              <a:t>Pays:</a:t>
+              <a:rPr lang="fr-CA" sz="1600" dirty="0"/>
+              <a:t>Province :</a:t>
             </a:r>
             <a:endParaRPr lang="fr-CA" sz="1600" dirty="0"/>
           </a:p>
@@ -3594,7 +3607,7 @@
         </p:blipFill>
         <p:spPr>
           <a:xfrm>
-            <a:off x="5125446" y="5069944"/>
+            <a:off x="5125446" y="4970156"/>
             <a:ext cx="1879412" cy="139367"/>
           </a:xfrm>
           <a:prstGeom prst="rect">
@@ -3610,7 +3623,7 @@
         </p:nvSpPr>
         <p:spPr>
           <a:xfrm>
-            <a:off x="3084024" y="4891209"/>
+            <a:off x="3084024" y="5331781"/>
             <a:ext cx="2105805" cy="338554"/>
           </a:xfrm>
           <a:prstGeom prst="rect">
@@ -3663,8 +3676,8 @@
         </p:nvSpPr>
         <p:spPr>
           <a:xfrm>
-            <a:off x="3167149" y="5367969"/>
-            <a:ext cx="2016078" cy="338554"/>
+            <a:off x="4056611" y="5816855"/>
+            <a:ext cx="1143242" cy="338554"/>
           </a:xfrm>
           <a:prstGeom prst="rect">
             <a:avLst/>
@@ -3679,12 +3692,152 @@
           <a:p>
             <a:r>
               <a:rPr lang="fr-CA" sz="1600" dirty="0" smtClean="0"/>
-              <a:t>Disponible(Oui/Non):</a:t>
+              <a:t>Disponible:</a:t>
             </a:r>
             <a:endParaRPr lang="fr-CA" sz="1600" dirty="0"/>
           </a:p>
         </p:txBody>
       </p:sp>
+      <p:pic>
+        <p:nvPicPr>
+          <p:cNvPr id="2" name="Image 1"/>
+          <p:cNvPicPr>
+            <a:picLocks noChangeAspect="1"/>
+          </p:cNvPicPr>
+          <p:nvPr/>
+        </p:nvPicPr>
+        <p:blipFill>
+          <a:blip r:embed="rId12">
+            <a:duotone>
+              <a:schemeClr val="accent2">
+                <a:shade val="45000"/>
+                <a:satMod val="135000"/>
+              </a:schemeClr>
+              <a:prstClr val="white"/>
+            </a:duotone>
+            <a:extLst>
+              <a:ext uri="{BEBA8EAE-BF5A-486C-A8C5-ECC9F3942E4B}">
+                <a14:imgProps xmlns:a14="http://schemas.microsoft.com/office/drawing/2010/main">
+                  <a14:imgLayer r:embed="rId13">
+                    <a14:imgEffect>
+                      <a14:saturation sat="0"/>
+                    </a14:imgEffect>
+                  </a14:imgLayer>
+                </a14:imgProps>
+              </a:ext>
+            </a:extLst>
+          </a:blip>
+          <a:stretch>
+            <a:fillRect/>
+          </a:stretch>
+        </p:blipFill>
+        <p:spPr>
+          <a:xfrm>
+            <a:off x="6241818" y="6268895"/>
+            <a:ext cx="1247949" cy="438211"/>
+          </a:xfrm>
+          <a:prstGeom prst="rect">
+            <a:avLst/>
+          </a:prstGeom>
+        </p:spPr>
+      </p:pic>
+      <p:pic>
+        <p:nvPicPr>
+          <p:cNvPr id="3" name="Image 2"/>
+          <p:cNvPicPr>
+            <a:picLocks noChangeAspect="1"/>
+          </p:cNvPicPr>
+          <p:nvPr/>
+        </p:nvPicPr>
+        <p:blipFill>
+          <a:blip r:embed="rId14">
+            <a:duotone>
+              <a:schemeClr val="accent3">
+                <a:shade val="45000"/>
+                <a:satMod val="135000"/>
+              </a:schemeClr>
+              <a:prstClr val="white"/>
+            </a:duotone>
+            <a:extLst>
+              <a:ext uri="{BEBA8EAE-BF5A-486C-A8C5-ECC9F3942E4B}">
+                <a14:imgProps xmlns:a14="http://schemas.microsoft.com/office/drawing/2010/main">
+                  <a14:imgLayer r:embed="rId15">
+                    <a14:imgEffect>
+                      <a14:saturation sat="0"/>
+                    </a14:imgEffect>
+                  </a14:imgLayer>
+                </a14:imgProps>
+              </a:ext>
+            </a:extLst>
+          </a:blip>
+          <a:stretch>
+            <a:fillRect/>
+          </a:stretch>
+        </p:blipFill>
+        <p:spPr>
+          <a:xfrm>
+            <a:off x="4338245" y="6268895"/>
+            <a:ext cx="1009791" cy="438211"/>
+          </a:xfrm>
+          <a:prstGeom prst="rect">
+            <a:avLst/>
+          </a:prstGeom>
+        </p:spPr>
+      </p:pic>
+      <p:sp>
+        <p:nvSpPr>
+          <p:cNvPr id="32" name="ZoneTexte 31"/>
+          <p:cNvSpPr txBox="1"/>
+          <p:nvPr/>
+        </p:nvSpPr>
+        <p:spPr>
+          <a:xfrm>
+            <a:off x="4501992" y="4788344"/>
+            <a:ext cx="613023" cy="338554"/>
+          </a:xfrm>
+          <a:prstGeom prst="rect">
+            <a:avLst/>
+          </a:prstGeom>
+          <a:noFill/>
+        </p:spPr>
+        <p:txBody>
+          <a:bodyPr wrap="square" rtlCol="0">
+            <a:spAutoFit/>
+          </a:bodyPr>
+          <a:lstStyle/>
+          <a:p>
+            <a:r>
+              <a:rPr lang="fr-CA" sz="1600" dirty="0" smtClean="0"/>
+              <a:t>Pays:</a:t>
+            </a:r>
+            <a:endParaRPr lang="fr-CA" sz="1600" dirty="0"/>
+          </a:p>
+        </p:txBody>
+      </p:sp>
+      <p:pic>
+        <p:nvPicPr>
+          <p:cNvPr id="4" name="Image 3"/>
+          <p:cNvPicPr>
+            <a:picLocks noChangeAspect="1"/>
+          </p:cNvPicPr>
+          <p:nvPr/>
+        </p:nvPicPr>
+        <p:blipFill>
+          <a:blip r:embed="rId16"/>
+          <a:stretch>
+            <a:fillRect/>
+          </a:stretch>
+        </p:blipFill>
+        <p:spPr>
+          <a:xfrm>
+            <a:off x="5348036" y="5800076"/>
+            <a:ext cx="1257475" cy="314369"/>
+          </a:xfrm>
+          <a:prstGeom prst="rect">
+            <a:avLst/>
+          </a:prstGeom>
+        </p:spPr>
+      </p:pic>
     </p:spTree>
     <p:extLst>
       <p:ext uri="{BB962C8B-B14F-4D97-AF65-F5344CB8AC3E}">

</xml_diff>